<commit_message>
added ggplot2 cheat sheet to zip
</commit_message>
<xml_diff>
--- a/taller_ggplot2/ggplot.pptx
+++ b/taller_ggplot2/ggplot.pptx
@@ -17,6 +17,7 @@
     <p:sldId id="266" r:id="rId11"/>
     <p:sldId id="265" r:id="rId12"/>
     <p:sldId id="267" r:id="rId13"/>
+    <p:sldId id="268" r:id="rId14"/>
   </p:sldIdLst>
   <p:sldSz cx="12192000" cy="6858000"/>
   <p:notesSz cx="6858000" cy="9144000"/>
@@ -115,6 +116,11 @@
       </a:defRPr>
     </a:lvl9pPr>
   </p:defaultTextStyle>
+  <p:extLst>
+    <p:ext uri="{EFAFB233-063F-42B5-8137-9DF3F51BA10A}">
+      <p15:sldGuideLst xmlns:p15="http://schemas.microsoft.com/office/powerpoint/2012/main"/>
+    </p:ext>
+  </p:extLst>
 </p:presentation>
 </file>
 
@@ -267,7 +273,7 @@
           <a:p>
             <a:fld id="{A532C138-119E-1243-B880-EC2372179964}" type="datetimeFigureOut">
               <a:rPr lang="en-CL" smtClean="0"/>
-              <a:t>22-05-24</a:t>
+              <a:t>23-05-24</a:t>
             </a:fld>
             <a:endParaRPr lang="en-CL"/>
           </a:p>
@@ -467,7 +473,7 @@
           <a:p>
             <a:fld id="{A532C138-119E-1243-B880-EC2372179964}" type="datetimeFigureOut">
               <a:rPr lang="en-CL" smtClean="0"/>
-              <a:t>22-05-24</a:t>
+              <a:t>23-05-24</a:t>
             </a:fld>
             <a:endParaRPr lang="en-CL"/>
           </a:p>
@@ -677,7 +683,7 @@
           <a:p>
             <a:fld id="{A532C138-119E-1243-B880-EC2372179964}" type="datetimeFigureOut">
               <a:rPr lang="en-CL" smtClean="0"/>
-              <a:t>22-05-24</a:t>
+              <a:t>23-05-24</a:t>
             </a:fld>
             <a:endParaRPr lang="en-CL"/>
           </a:p>
@@ -877,7 +883,7 @@
           <a:p>
             <a:fld id="{A532C138-119E-1243-B880-EC2372179964}" type="datetimeFigureOut">
               <a:rPr lang="en-CL" smtClean="0"/>
-              <a:t>22-05-24</a:t>
+              <a:t>23-05-24</a:t>
             </a:fld>
             <a:endParaRPr lang="en-CL"/>
           </a:p>
@@ -1153,7 +1159,7 @@
           <a:p>
             <a:fld id="{A532C138-119E-1243-B880-EC2372179964}" type="datetimeFigureOut">
               <a:rPr lang="en-CL" smtClean="0"/>
-              <a:t>22-05-24</a:t>
+              <a:t>23-05-24</a:t>
             </a:fld>
             <a:endParaRPr lang="en-CL"/>
           </a:p>
@@ -1421,7 +1427,7 @@
           <a:p>
             <a:fld id="{A532C138-119E-1243-B880-EC2372179964}" type="datetimeFigureOut">
               <a:rPr lang="en-CL" smtClean="0"/>
-              <a:t>22-05-24</a:t>
+              <a:t>23-05-24</a:t>
             </a:fld>
             <a:endParaRPr lang="en-CL"/>
           </a:p>
@@ -1836,7 +1842,7 @@
           <a:p>
             <a:fld id="{A532C138-119E-1243-B880-EC2372179964}" type="datetimeFigureOut">
               <a:rPr lang="en-CL" smtClean="0"/>
-              <a:t>22-05-24</a:t>
+              <a:t>23-05-24</a:t>
             </a:fld>
             <a:endParaRPr lang="en-CL"/>
           </a:p>
@@ -1978,7 +1984,7 @@
           <a:p>
             <a:fld id="{A532C138-119E-1243-B880-EC2372179964}" type="datetimeFigureOut">
               <a:rPr lang="en-CL" smtClean="0"/>
-              <a:t>22-05-24</a:t>
+              <a:t>23-05-24</a:t>
             </a:fld>
             <a:endParaRPr lang="en-CL"/>
           </a:p>
@@ -2091,7 +2097,7 @@
           <a:p>
             <a:fld id="{A532C138-119E-1243-B880-EC2372179964}" type="datetimeFigureOut">
               <a:rPr lang="en-CL" smtClean="0"/>
-              <a:t>22-05-24</a:t>
+              <a:t>23-05-24</a:t>
             </a:fld>
             <a:endParaRPr lang="en-CL"/>
           </a:p>
@@ -2404,7 +2410,7 @@
           <a:p>
             <a:fld id="{A532C138-119E-1243-B880-EC2372179964}" type="datetimeFigureOut">
               <a:rPr lang="en-CL" smtClean="0"/>
-              <a:t>22-05-24</a:t>
+              <a:t>23-05-24</a:t>
             </a:fld>
             <a:endParaRPr lang="en-CL"/>
           </a:p>
@@ -2693,7 +2699,7 @@
           <a:p>
             <a:fld id="{A532C138-119E-1243-B880-EC2372179964}" type="datetimeFigureOut">
               <a:rPr lang="en-CL" smtClean="0"/>
-              <a:t>22-05-24</a:t>
+              <a:t>23-05-24</a:t>
             </a:fld>
             <a:endParaRPr lang="en-CL"/>
           </a:p>
@@ -2936,7 +2942,7 @@
           <a:p>
             <a:fld id="{A532C138-119E-1243-B880-EC2372179964}" type="datetimeFigureOut">
               <a:rPr lang="en-CL" smtClean="0"/>
-              <a:t>22-05-24</a:t>
+              <a:t>23-05-24</a:t>
             </a:fld>
             <a:endParaRPr lang="en-CL"/>
           </a:p>
@@ -5968,6 +5974,485 @@
 </p:sld>
 </file>
 
+<file path=ppt/slides/slide13.xml><?xml version="1.0" encoding="utf-8"?>
+<p:sld xmlns:a="http://schemas.openxmlformats.org/drawingml/2006/main" xmlns:r="http://schemas.openxmlformats.org/officeDocument/2006/relationships" xmlns:p="http://schemas.openxmlformats.org/presentationml/2006/main">
+  <p:cSld>
+    <p:bg>
+      <p:bgPr>
+        <a:solidFill>
+          <a:schemeClr val="bg1"/>
+        </a:solidFill>
+        <a:effectLst/>
+      </p:bgPr>
+    </p:bg>
+    <p:spTree>
+      <p:nvGrpSpPr>
+        <p:cNvPr id="1" name=""/>
+        <p:cNvGrpSpPr/>
+        <p:nvPr/>
+      </p:nvGrpSpPr>
+      <p:grpSpPr>
+        <a:xfrm>
+          <a:off x="0" y="0"/>
+          <a:ext cx="0" cy="0"/>
+          <a:chOff x="0" y="0"/>
+          <a:chExt cx="0" cy="0"/>
+        </a:xfrm>
+      </p:grpSpPr>
+      <p:sp useBgFill="1">
+        <p:nvSpPr>
+          <p:cNvPr id="10" name="Rectangle 9">
+            <a:extLst>
+              <a:ext uri="{FF2B5EF4-FFF2-40B4-BE49-F238E27FC236}">
+                <a16:creationId xmlns:a16="http://schemas.microsoft.com/office/drawing/2014/main" id="{DBC6133C-0615-4CE4-9132-37E609A9BDFA}"/>
+              </a:ext>
+              <a:ext uri="{C183D7F6-B498-43B3-948B-1728B52AA6E4}">
+                <adec:decorative xmlns:adec="http://schemas.microsoft.com/office/drawing/2017/decorative" val="1"/>
+              </a:ext>
+            </a:extLst>
+          </p:cNvPr>
+          <p:cNvSpPr>
+            <a:spLocks noGrp="1" noRot="1" noChangeAspect="1" noMove="1" noResize="1" noEditPoints="1" noAdjustHandles="1" noChangeArrowheads="1" noChangeShapeType="1" noTextEdit="1"/>
+          </p:cNvSpPr>
+          <p:nvPr>
+            <p:extLst>
+              <p:ext uri="{386F3935-93C4-4BCD-93E2-E3B085C9AB24}">
+                <p16:designElem xmlns:p16="http://schemas.microsoft.com/office/powerpoint/2015/main" val="1"/>
+              </p:ext>
+            </p:extLst>
+          </p:nvPr>
+        </p:nvSpPr>
+        <p:spPr>
+          <a:xfrm>
+            <a:off x="0" y="0"/>
+            <a:ext cx="12191999" cy="6857365"/>
+          </a:xfrm>
+          <a:prstGeom prst="rect">
+            <a:avLst/>
+          </a:prstGeom>
+          <a:ln>
+            <a:noFill/>
+          </a:ln>
+        </p:spPr>
+        <p:style>
+          <a:lnRef idx="2">
+            <a:schemeClr val="accent1">
+              <a:shade val="50000"/>
+            </a:schemeClr>
+          </a:lnRef>
+          <a:fillRef idx="1">
+            <a:schemeClr val="accent1"/>
+          </a:fillRef>
+          <a:effectRef idx="0">
+            <a:schemeClr val="accent1"/>
+          </a:effectRef>
+          <a:fontRef idx="minor">
+            <a:schemeClr val="lt1"/>
+          </a:fontRef>
+        </p:style>
+        <p:txBody>
+          <a:bodyPr rtlCol="0" anchor="ctr"/>
+          <a:lstStyle/>
+          <a:p>
+            <a:pPr algn="ctr"/>
+            <a:endParaRPr lang="en-US"/>
+          </a:p>
+        </p:txBody>
+      </p:sp>
+      <p:sp>
+        <p:nvSpPr>
+          <p:cNvPr id="12" name="Rectangle 11">
+            <a:extLst>
+              <a:ext uri="{FF2B5EF4-FFF2-40B4-BE49-F238E27FC236}">
+                <a16:creationId xmlns:a16="http://schemas.microsoft.com/office/drawing/2014/main" id="{169CC832-2974-4E8D-90ED-3E2941BA7336}"/>
+              </a:ext>
+              <a:ext uri="{C183D7F6-B498-43B3-948B-1728B52AA6E4}">
+                <adec:decorative xmlns:adec="http://schemas.microsoft.com/office/drawing/2017/decorative" val="1"/>
+              </a:ext>
+            </a:extLst>
+          </p:cNvPr>
+          <p:cNvSpPr>
+            <a:spLocks noGrp="1" noRot="1" noChangeAspect="1" noMove="1" noResize="1" noEditPoints="1" noAdjustHandles="1" noChangeArrowheads="1" noChangeShapeType="1" noTextEdit="1"/>
+          </p:cNvSpPr>
+          <p:nvPr>
+            <p:extLst>
+              <p:ext uri="{386F3935-93C4-4BCD-93E2-E3B085C9AB24}">
+                <p16:designElem xmlns:p16="http://schemas.microsoft.com/office/powerpoint/2015/main" val="1"/>
+              </p:ext>
+            </p:extLst>
+          </p:nvPr>
+        </p:nvSpPr>
+        <p:spPr>
+          <a:xfrm flipH="1">
+            <a:off x="616533" y="1944913"/>
+            <a:ext cx="4023360" cy="27432"/>
+          </a:xfrm>
+          <a:prstGeom prst="rect">
+            <a:avLst/>
+          </a:prstGeom>
+          <a:solidFill>
+            <a:schemeClr val="accent4"/>
+          </a:solidFill>
+          <a:ln>
+            <a:noFill/>
+          </a:ln>
+        </p:spPr>
+        <p:style>
+          <a:lnRef idx="2">
+            <a:schemeClr val="accent1">
+              <a:shade val="50000"/>
+            </a:schemeClr>
+          </a:lnRef>
+          <a:fillRef idx="1">
+            <a:schemeClr val="accent1"/>
+          </a:fillRef>
+          <a:effectRef idx="0">
+            <a:schemeClr val="accent1"/>
+          </a:effectRef>
+          <a:fontRef idx="minor">
+            <a:schemeClr val="lt1"/>
+          </a:fontRef>
+        </p:style>
+        <p:txBody>
+          <a:bodyPr rtlCol="0" anchor="ctr"/>
+          <a:lstStyle/>
+          <a:p>
+            <a:pPr algn="ctr"/>
+            <a:endParaRPr lang="en-US"/>
+          </a:p>
+        </p:txBody>
+      </p:sp>
+      <p:sp>
+        <p:nvSpPr>
+          <p:cNvPr id="3" name="TextBox 2">
+            <a:extLst>
+              <a:ext uri="{FF2B5EF4-FFF2-40B4-BE49-F238E27FC236}">
+                <a16:creationId xmlns:a16="http://schemas.microsoft.com/office/drawing/2014/main" id="{2E6EDEAA-3248-147A-907D-4732D804574F}"/>
+              </a:ext>
+            </a:extLst>
+          </p:cNvPr>
+          <p:cNvSpPr txBox="1"/>
+          <p:nvPr/>
+        </p:nvSpPr>
+        <p:spPr>
+          <a:xfrm>
+            <a:off x="645066" y="2031101"/>
+            <a:ext cx="4917534" cy="3511943"/>
+          </a:xfrm>
+          <a:prstGeom prst="rect">
+            <a:avLst/>
+          </a:prstGeom>
+        </p:spPr>
+        <p:txBody>
+          <a:bodyPr vert="horz" lIns="91440" tIns="45720" rIns="91440" bIns="45720" rtlCol="0" anchor="ctr">
+            <a:normAutofit/>
+          </a:bodyPr>
+          <a:lstStyle/>
+          <a:p>
+            <a:pPr indent="-228600">
+              <a:lnSpc>
+                <a:spcPct val="90000"/>
+              </a:lnSpc>
+              <a:spcAft>
+                <a:spcPts val="600"/>
+              </a:spcAft>
+              <a:buFont typeface="Arial" panose="020B0604020202020204" pitchFamily="34" charset="0"/>
+              <a:buChar char="•"/>
+            </a:pPr>
+            <a:r>
+              <a:rPr lang="en-US" sz="2400" dirty="0">
+                <a:solidFill>
+                  <a:srgbClr val="165F81"/>
+                </a:solidFill>
+                <a:latin typeface="Verdana" panose="020B0604030504040204" pitchFamily="34" charset="0"/>
+                <a:ea typeface="Verdana" panose="020B0604030504040204" pitchFamily="34" charset="0"/>
+                <a:cs typeface="Verdana" panose="020B0604030504040204" pitchFamily="34" charset="0"/>
+              </a:rPr>
+              <a:t>https://</a:t>
+            </a:r>
+            <a:r>
+              <a:rPr lang="en-US" sz="2400" dirty="0" err="1">
+                <a:solidFill>
+                  <a:srgbClr val="165F81"/>
+                </a:solidFill>
+                <a:latin typeface="Verdana" panose="020B0604030504040204" pitchFamily="34" charset="0"/>
+                <a:ea typeface="Verdana" panose="020B0604030504040204" pitchFamily="34" charset="0"/>
+                <a:cs typeface="Verdana" panose="020B0604030504040204" pitchFamily="34" charset="0"/>
+              </a:rPr>
+              <a:t>tinyurl.com</a:t>
+            </a:r>
+            <a:r>
+              <a:rPr lang="en-US" sz="2400" dirty="0">
+                <a:solidFill>
+                  <a:srgbClr val="165F81"/>
+                </a:solidFill>
+                <a:latin typeface="Verdana" panose="020B0604030504040204" pitchFamily="34" charset="0"/>
+                <a:ea typeface="Verdana" panose="020B0604030504040204" pitchFamily="34" charset="0"/>
+                <a:cs typeface="Verdana" panose="020B0604030504040204" pitchFamily="34" charset="0"/>
+              </a:rPr>
+              <a:t>/</a:t>
+            </a:r>
+            <a:r>
+              <a:rPr lang="en-US" sz="2400" dirty="0" err="1">
+                <a:solidFill>
+                  <a:srgbClr val="165F81"/>
+                </a:solidFill>
+                <a:latin typeface="Verdana" panose="020B0604030504040204" pitchFamily="34" charset="0"/>
+                <a:ea typeface="Verdana" panose="020B0604030504040204" pitchFamily="34" charset="0"/>
+                <a:cs typeface="Verdana" panose="020B0604030504040204" pitchFamily="34" charset="0"/>
+              </a:rPr>
+              <a:t>tallerudd</a:t>
+            </a:r>
+            <a:endParaRPr lang="en-US" sz="2400" dirty="0">
+              <a:solidFill>
+                <a:srgbClr val="165F81"/>
+              </a:solidFill>
+              <a:latin typeface="Verdana" panose="020B0604030504040204" pitchFamily="34" charset="0"/>
+              <a:ea typeface="Verdana" panose="020B0604030504040204" pitchFamily="34" charset="0"/>
+              <a:cs typeface="Verdana" panose="020B0604030504040204" pitchFamily="34" charset="0"/>
+            </a:endParaRPr>
+          </a:p>
+        </p:txBody>
+      </p:sp>
+      <p:sp>
+        <p:nvSpPr>
+          <p:cNvPr id="14" name="Rectangle 13">
+            <a:extLst>
+              <a:ext uri="{FF2B5EF4-FFF2-40B4-BE49-F238E27FC236}">
+                <a16:creationId xmlns:a16="http://schemas.microsoft.com/office/drawing/2014/main" id="{55222F96-971A-4F90-B841-6BAB416C7AC1}"/>
+              </a:ext>
+              <a:ext uri="{C183D7F6-B498-43B3-948B-1728B52AA6E4}">
+                <adec:decorative xmlns:adec="http://schemas.microsoft.com/office/drawing/2017/decorative" val="1"/>
+              </a:ext>
+            </a:extLst>
+          </p:cNvPr>
+          <p:cNvSpPr>
+            <a:spLocks noGrp="1" noRot="1" noChangeAspect="1" noMove="1" noResize="1" noEditPoints="1" noAdjustHandles="1" noChangeArrowheads="1" noChangeShapeType="1" noTextEdit="1"/>
+          </p:cNvSpPr>
+          <p:nvPr>
+            <p:extLst>
+              <p:ext uri="{386F3935-93C4-4BCD-93E2-E3B085C9AB24}">
+                <p16:designElem xmlns:p16="http://schemas.microsoft.com/office/powerpoint/2015/main" val="1"/>
+              </p:ext>
+            </p:extLst>
+          </p:nvPr>
+        </p:nvSpPr>
+        <p:spPr>
+          <a:xfrm rot="5400000">
+            <a:off x="-225843" y="6053360"/>
+            <a:ext cx="740664" cy="154124"/>
+          </a:xfrm>
+          <a:prstGeom prst="rect">
+            <a:avLst/>
+          </a:prstGeom>
+          <a:solidFill>
+            <a:schemeClr val="accent4"/>
+          </a:solidFill>
+          <a:ln>
+            <a:noFill/>
+          </a:ln>
+        </p:spPr>
+        <p:style>
+          <a:lnRef idx="2">
+            <a:schemeClr val="accent1">
+              <a:shade val="50000"/>
+            </a:schemeClr>
+          </a:lnRef>
+          <a:fillRef idx="1">
+            <a:schemeClr val="accent1"/>
+          </a:fillRef>
+          <a:effectRef idx="0">
+            <a:schemeClr val="accent1"/>
+          </a:effectRef>
+          <a:fontRef idx="minor">
+            <a:schemeClr val="lt1"/>
+          </a:fontRef>
+        </p:style>
+        <p:txBody>
+          <a:bodyPr rtlCol="0" anchor="ctr"/>
+          <a:lstStyle/>
+          <a:p>
+            <a:pPr algn="ctr"/>
+            <a:endParaRPr lang="en-US"/>
+          </a:p>
+        </p:txBody>
+      </p:sp>
+      <p:sp>
+        <p:nvSpPr>
+          <p:cNvPr id="16" name="Rectangle 15">
+            <a:extLst>
+              <a:ext uri="{FF2B5EF4-FFF2-40B4-BE49-F238E27FC236}">
+                <a16:creationId xmlns:a16="http://schemas.microsoft.com/office/drawing/2014/main" id="{08980754-6F4B-43C9-B9BE-127B6BED6586}"/>
+              </a:ext>
+              <a:ext uri="{C183D7F6-B498-43B3-948B-1728B52AA6E4}">
+                <adec:decorative xmlns:adec="http://schemas.microsoft.com/office/drawing/2017/decorative" val="1"/>
+              </a:ext>
+            </a:extLst>
+          </p:cNvPr>
+          <p:cNvSpPr>
+            <a:spLocks noGrp="1" noRot="1" noChangeAspect="1" noMove="1" noResize="1" noEditPoints="1" noAdjustHandles="1" noChangeArrowheads="1" noChangeShapeType="1" noTextEdit="1"/>
+          </p:cNvSpPr>
+          <p:nvPr>
+            <p:extLst>
+              <p:ext uri="{386F3935-93C4-4BCD-93E2-E3B085C9AB24}">
+                <p16:designElem xmlns:p16="http://schemas.microsoft.com/office/powerpoint/2015/main" val="1"/>
+              </p:ext>
+            </p:extLst>
+          </p:nvPr>
+        </p:nvSpPr>
+        <p:spPr>
+          <a:xfrm rot="5400000">
+            <a:off x="5904923" y="215201"/>
+            <a:ext cx="740664" cy="11833491"/>
+          </a:xfrm>
+          <a:prstGeom prst="rect">
+            <a:avLst/>
+          </a:prstGeom>
+          <a:solidFill>
+            <a:schemeClr val="accent4"/>
+          </a:solidFill>
+          <a:ln>
+            <a:noFill/>
+          </a:ln>
+        </p:spPr>
+        <p:style>
+          <a:lnRef idx="2">
+            <a:schemeClr val="accent1">
+              <a:shade val="50000"/>
+            </a:schemeClr>
+          </a:lnRef>
+          <a:fillRef idx="1">
+            <a:schemeClr val="accent1"/>
+          </a:fillRef>
+          <a:effectRef idx="0">
+            <a:schemeClr val="accent1"/>
+          </a:effectRef>
+          <a:fontRef idx="minor">
+            <a:schemeClr val="lt1"/>
+          </a:fontRef>
+        </p:style>
+        <p:txBody>
+          <a:bodyPr rtlCol="0" anchor="ctr"/>
+          <a:lstStyle/>
+          <a:p>
+            <a:pPr algn="ctr"/>
+            <a:endParaRPr lang="en-US"/>
+          </a:p>
+        </p:txBody>
+      </p:sp>
+      <p:sp>
+        <p:nvSpPr>
+          <p:cNvPr id="18" name="Rectangle 17">
+            <a:extLst>
+              <a:ext uri="{FF2B5EF4-FFF2-40B4-BE49-F238E27FC236}">
+                <a16:creationId xmlns:a16="http://schemas.microsoft.com/office/drawing/2014/main" id="{2C1BBA94-3F40-40AA-8BB9-E69E25E537C1}"/>
+              </a:ext>
+              <a:ext uri="{C183D7F6-B498-43B3-948B-1728B52AA6E4}">
+                <adec:decorative xmlns:adec="http://schemas.microsoft.com/office/drawing/2017/decorative" val="1"/>
+              </a:ext>
+            </a:extLst>
+          </p:cNvPr>
+          <p:cNvSpPr>
+            <a:spLocks noGrp="1" noRot="1" noChangeAspect="1" noMove="1" noResize="1" noEditPoints="1" noAdjustHandles="1" noChangeArrowheads="1" noChangeShapeType="1" noTextEdit="1"/>
+          </p:cNvSpPr>
+          <p:nvPr>
+            <p:extLst>
+              <p:ext uri="{386F3935-93C4-4BCD-93E2-E3B085C9AB24}">
+                <p16:designElem xmlns:p16="http://schemas.microsoft.com/office/powerpoint/2015/main" val="1"/>
+              </p:ext>
+            </p:extLst>
+          </p:nvPr>
+        </p:nvSpPr>
+        <p:spPr>
+          <a:xfrm>
+            <a:off x="5696793" y="354959"/>
+            <a:ext cx="6184973" cy="5915212"/>
+          </a:xfrm>
+          <a:prstGeom prst="rect">
+            <a:avLst/>
+          </a:prstGeom>
+          <a:solidFill>
+            <a:schemeClr val="bg1"/>
+          </a:solidFill>
+          <a:ln>
+            <a:noFill/>
+          </a:ln>
+          <a:effectLst>
+            <a:outerShdw blurRad="139700" dist="127000" dir="5400000" algn="t" rotWithShape="0">
+              <a:prstClr val="black">
+                <a:alpha val="15000"/>
+              </a:prstClr>
+            </a:outerShdw>
+          </a:effectLst>
+        </p:spPr>
+        <p:style>
+          <a:lnRef idx="2">
+            <a:schemeClr val="accent1">
+              <a:shade val="50000"/>
+            </a:schemeClr>
+          </a:lnRef>
+          <a:fillRef idx="1">
+            <a:schemeClr val="accent1"/>
+          </a:fillRef>
+          <a:effectRef idx="0">
+            <a:schemeClr val="accent1"/>
+          </a:effectRef>
+          <a:fontRef idx="minor">
+            <a:schemeClr val="lt1"/>
+          </a:fontRef>
+        </p:style>
+        <p:txBody>
+          <a:bodyPr rtlCol="0" anchor="ctr"/>
+          <a:lstStyle/>
+          <a:p>
+            <a:pPr algn="ctr"/>
+            <a:endParaRPr lang="en-US"/>
+          </a:p>
+        </p:txBody>
+      </p:sp>
+      <p:pic>
+        <p:nvPicPr>
+          <p:cNvPr id="5" name="Picture 4" descr="A qr code with a black and white background&#10;&#10;Description automatically generated">
+            <a:extLst>
+              <a:ext uri="{FF2B5EF4-FFF2-40B4-BE49-F238E27FC236}">
+                <a16:creationId xmlns:a16="http://schemas.microsoft.com/office/drawing/2014/main" id="{DFB4CA62-008C-C332-94DD-B0B75B327E41}"/>
+              </a:ext>
+            </a:extLst>
+          </p:cNvPr>
+          <p:cNvPicPr>
+            <a:picLocks noChangeAspect="1"/>
+          </p:cNvPicPr>
+          <p:nvPr/>
+        </p:nvPicPr>
+        <p:blipFill>
+          <a:blip r:embed="rId2"/>
+          <a:stretch>
+            <a:fillRect/>
+          </a:stretch>
+        </p:blipFill>
+        <p:spPr>
+          <a:xfrm>
+            <a:off x="6139676" y="650494"/>
+            <a:ext cx="5324142" cy="5324142"/>
+          </a:xfrm>
+          <a:prstGeom prst="rect">
+            <a:avLst/>
+          </a:prstGeom>
+        </p:spPr>
+      </p:pic>
+    </p:spTree>
+    <p:extLst>
+      <p:ext uri="{BB962C8B-B14F-4D97-AF65-F5344CB8AC3E}">
+        <p14:creationId xmlns:p14="http://schemas.microsoft.com/office/powerpoint/2010/main" val="1968128752"/>
+      </p:ext>
+    </p:extLst>
+  </p:cSld>
+  <p:clrMapOvr>
+    <a:masterClrMapping/>
+  </p:clrMapOvr>
+</p:sld>
+</file>
+
 <file path=ppt/slides/slide2.xml><?xml version="1.0" encoding="utf-8"?>
 <p:sld xmlns:a="http://schemas.openxmlformats.org/drawingml/2006/main" xmlns:r="http://schemas.openxmlformats.org/officeDocument/2006/relationships" xmlns:p="http://schemas.openxmlformats.org/presentationml/2006/main">
   <p:cSld>

</xml_diff>